<commit_message>
edit slide 15 in basics
</commit_message>
<xml_diff>
--- a/Level 0/Basics of CP.pptx
+++ b/Level 0/Basics of CP.pptx
@@ -326,7 +326,7 @@
           <a:p>
             <a:fld id="{EED35E4C-F3CB-448E-AAC2-A8FDBC6E8200}" type="datetimeFigureOut">
               <a:rPr lang="en-US" smtClean="0"/>
-              <a:t>9/20/2023</a:t>
+              <a:t>9/22/2023</a:t>
             </a:fld>
             <a:endParaRPr lang="en-US"/>
           </a:p>
@@ -504,7 +504,7 @@
           <a:p>
             <a:fld id="{91770BF1-AEE4-480A-9D6B-93722DA4C316}" type="datetimeFigureOut">
               <a:rPr lang="en-US" smtClean="0"/>
-              <a:t>9/20/2023</a:t>
+              <a:t>9/22/2023</a:t>
             </a:fld>
             <a:endParaRPr lang="en-US"/>
           </a:p>
@@ -5568,7 +5568,27 @@
                 </a:solidFill>
                 <a:hlinkClick r:id="rId6"/>
               </a:rPr>
-              <a:t> - drinks</a:t>
+              <a:t> – drinks</a:t>
+            </a:r>
+            <a:r>
+              <a:rPr lang="en-US" sz="2400" dirty="0">
+                <a:solidFill>
+                  <a:schemeClr val="bg2">
+                    <a:lumMod val="50000"/>
+                  </a:schemeClr>
+                </a:solidFill>
+              </a:rPr>
+              <a:t> // back to it </a:t>
+            </a:r>
+            <a:r>
+              <a:rPr lang="en-US" sz="2400">
+                <a:solidFill>
+                  <a:schemeClr val="bg2">
+                    <a:lumMod val="50000"/>
+                  </a:schemeClr>
+                </a:solidFill>
+              </a:rPr>
+              <a:t>after learn loops </a:t>
             </a:r>
             <a:endParaRPr lang="en-US" sz="2400" dirty="0">
               <a:solidFill>

</xml_diff>